<commit_message>
Changed SR logo and TUDA picture, added BMG logo
</commit_message>
<xml_diff>
--- a/eva-ki/images/logos/Presentation1.pptx
+++ b/eva-ki/images/logos/Presentation1.pptx
@@ -108,6 +108,11 @@
       </a:defRPr>
     </a:lvl9pPr>
   </p:defaultTextStyle>
+  <p:extLst>
+    <p:ext uri="{EFAFB233-063F-42B5-8137-9DF3F51BA10A}">
+      <p15:sldGuideLst xmlns:p15="http://schemas.microsoft.com/office/powerpoint/2012/main"/>
+    </p:ext>
+  </p:extLst>
 </p:presentation>
 </file>
 
@@ -242,7 +247,7 @@
           <a:p>
             <a:fld id="{C66141EB-4BFC-4196-B8F8-668E3D745776}" type="datetimeFigureOut">
               <a:rPr lang="en-DE" smtClean="0"/>
-              <a:t>16/11/2020</a:t>
+              <a:t>18/11/2020</a:t>
             </a:fld>
             <a:endParaRPr lang="en-DE"/>
           </a:p>
@@ -412,7 +417,7 @@
           <a:p>
             <a:fld id="{C66141EB-4BFC-4196-B8F8-668E3D745776}" type="datetimeFigureOut">
               <a:rPr lang="en-DE" smtClean="0"/>
-              <a:t>16/11/2020</a:t>
+              <a:t>18/11/2020</a:t>
             </a:fld>
             <a:endParaRPr lang="en-DE"/>
           </a:p>
@@ -592,7 +597,7 @@
           <a:p>
             <a:fld id="{C66141EB-4BFC-4196-B8F8-668E3D745776}" type="datetimeFigureOut">
               <a:rPr lang="en-DE" smtClean="0"/>
-              <a:t>16/11/2020</a:t>
+              <a:t>18/11/2020</a:t>
             </a:fld>
             <a:endParaRPr lang="en-DE"/>
           </a:p>
@@ -762,7 +767,7 @@
           <a:p>
             <a:fld id="{C66141EB-4BFC-4196-B8F8-668E3D745776}" type="datetimeFigureOut">
               <a:rPr lang="en-DE" smtClean="0"/>
-              <a:t>16/11/2020</a:t>
+              <a:t>18/11/2020</a:t>
             </a:fld>
             <a:endParaRPr lang="en-DE"/>
           </a:p>
@@ -1008,7 +1013,7 @@
           <a:p>
             <a:fld id="{C66141EB-4BFC-4196-B8F8-668E3D745776}" type="datetimeFigureOut">
               <a:rPr lang="en-DE" smtClean="0"/>
-              <a:t>16/11/2020</a:t>
+              <a:t>18/11/2020</a:t>
             </a:fld>
             <a:endParaRPr lang="en-DE"/>
           </a:p>
@@ -1240,7 +1245,7 @@
           <a:p>
             <a:fld id="{C66141EB-4BFC-4196-B8F8-668E3D745776}" type="datetimeFigureOut">
               <a:rPr lang="en-DE" smtClean="0"/>
-              <a:t>16/11/2020</a:t>
+              <a:t>18/11/2020</a:t>
             </a:fld>
             <a:endParaRPr lang="en-DE"/>
           </a:p>
@@ -1607,7 +1612,7 @@
           <a:p>
             <a:fld id="{C66141EB-4BFC-4196-B8F8-668E3D745776}" type="datetimeFigureOut">
               <a:rPr lang="en-DE" smtClean="0"/>
-              <a:t>16/11/2020</a:t>
+              <a:t>18/11/2020</a:t>
             </a:fld>
             <a:endParaRPr lang="en-DE"/>
           </a:p>
@@ -1725,7 +1730,7 @@
           <a:p>
             <a:fld id="{C66141EB-4BFC-4196-B8F8-668E3D745776}" type="datetimeFigureOut">
               <a:rPr lang="en-DE" smtClean="0"/>
-              <a:t>16/11/2020</a:t>
+              <a:t>18/11/2020</a:t>
             </a:fld>
             <a:endParaRPr lang="en-DE"/>
           </a:p>
@@ -1820,7 +1825,7 @@
           <a:p>
             <a:fld id="{C66141EB-4BFC-4196-B8F8-668E3D745776}" type="datetimeFigureOut">
               <a:rPr lang="en-DE" smtClean="0"/>
-              <a:t>16/11/2020</a:t>
+              <a:t>18/11/2020</a:t>
             </a:fld>
             <a:endParaRPr lang="en-DE"/>
           </a:p>
@@ -2097,7 +2102,7 @@
           <a:p>
             <a:fld id="{C66141EB-4BFC-4196-B8F8-668E3D745776}" type="datetimeFigureOut">
               <a:rPr lang="en-DE" smtClean="0"/>
-              <a:t>16/11/2020</a:t>
+              <a:t>18/11/2020</a:t>
             </a:fld>
             <a:endParaRPr lang="en-DE"/>
           </a:p>
@@ -2354,7 +2359,7 @@
           <a:p>
             <a:fld id="{C66141EB-4BFC-4196-B8F8-668E3D745776}" type="datetimeFigureOut">
               <a:rPr lang="en-DE" smtClean="0"/>
-              <a:t>16/11/2020</a:t>
+              <a:t>18/11/2020</a:t>
             </a:fld>
             <a:endParaRPr lang="en-DE"/>
           </a:p>
@@ -2567,7 +2572,7 @@
           <a:p>
             <a:fld id="{C66141EB-4BFC-4196-B8F8-668E3D745776}" type="datetimeFigureOut">
               <a:rPr lang="en-DE" smtClean="0"/>
-              <a:t>16/11/2020</a:t>
+              <a:t>18/11/2020</a:t>
             </a:fld>
             <a:endParaRPr lang="en-DE"/>
           </a:p>
@@ -3172,10 +3177,10 @@
       </p:grpSpPr>
       <p:pic>
         <p:nvPicPr>
-          <p:cNvPr id="5" name="Picture 4" descr="Text&#10;&#10;Description automatically generated">
+          <p:cNvPr id="3" name="Picture 2">
             <a:extLst>
               <a:ext uri="{FF2B5EF4-FFF2-40B4-BE49-F238E27FC236}">
-                <a16:creationId xmlns:a16="http://schemas.microsoft.com/office/drawing/2014/main" id="{C4E44181-A4DB-4A36-A7DC-0D0D70F281B6}"/>
+                <a16:creationId xmlns:a16="http://schemas.microsoft.com/office/drawing/2014/main" id="{98ACD09F-48F0-4A8A-AB6E-688F3EE17A15}"/>
               </a:ext>
             </a:extLst>
           </p:cNvPr>
@@ -3198,8 +3203,8 @@
         </p:blipFill>
         <p:spPr>
           <a:xfrm>
-            <a:off x="172375" y="418288"/>
-            <a:ext cx="4227250" cy="1449423"/>
+            <a:off x="236220" y="654443"/>
+            <a:ext cx="4099560" cy="977113"/>
           </a:xfrm>
           <a:prstGeom prst="rect">
             <a:avLst/>

</xml_diff>